<commit_message>
Removed empty text boxes from the presentations.
</commit_message>
<xml_diff>
--- a/PPT Bogi/Resources/EGW.pptx
+++ b/PPT Bogi/Resources/EGW.pptx
@@ -104,6 +104,11 @@
       </a:defRPr>
     </a:lvl9pPr>
   </p:defaultTextStyle>
+  <p:extLst>
+    <p:ext uri="{EFAFB233-063F-42B5-8137-9DF3F51BA10A}">
+      <p15:sldGuideLst xmlns:p15="http://schemas.microsoft.com/office/powerpoint/2012/main"/>
+    </p:ext>
+  </p:extLst>
 </p:presentation>
 </file>
 
@@ -256,7 +261,7 @@
           <a:p>
             <a:fld id="{F2F96090-85A3-4EE4-B8EC-DF25C09EBF6D}" type="datetimeFigureOut">
               <a:rPr lang="de-AT" smtClean="0"/>
-              <a:t>13.03.2023</a:t>
+              <a:t>20.03.2023</a:t>
             </a:fld>
             <a:endParaRPr lang="de-AT"/>
           </a:p>
@@ -456,7 +461,7 @@
           <a:p>
             <a:fld id="{F2F96090-85A3-4EE4-B8EC-DF25C09EBF6D}" type="datetimeFigureOut">
               <a:rPr lang="de-AT" smtClean="0"/>
-              <a:t>13.03.2023</a:t>
+              <a:t>20.03.2023</a:t>
             </a:fld>
             <a:endParaRPr lang="de-AT"/>
           </a:p>
@@ -666,7 +671,7 @@
           <a:p>
             <a:fld id="{F2F96090-85A3-4EE4-B8EC-DF25C09EBF6D}" type="datetimeFigureOut">
               <a:rPr lang="de-AT" smtClean="0"/>
-              <a:t>13.03.2023</a:t>
+              <a:t>20.03.2023</a:t>
             </a:fld>
             <a:endParaRPr lang="de-AT"/>
           </a:p>
@@ -866,7 +871,7 @@
           <a:p>
             <a:fld id="{F2F96090-85A3-4EE4-B8EC-DF25C09EBF6D}" type="datetimeFigureOut">
               <a:rPr lang="de-AT" smtClean="0"/>
-              <a:t>13.03.2023</a:t>
+              <a:t>20.03.2023</a:t>
             </a:fld>
             <a:endParaRPr lang="de-AT"/>
           </a:p>
@@ -1142,7 +1147,7 @@
           <a:p>
             <a:fld id="{F2F96090-85A3-4EE4-B8EC-DF25C09EBF6D}" type="datetimeFigureOut">
               <a:rPr lang="de-AT" smtClean="0"/>
-              <a:t>13.03.2023</a:t>
+              <a:t>20.03.2023</a:t>
             </a:fld>
             <a:endParaRPr lang="de-AT"/>
           </a:p>
@@ -1410,7 +1415,7 @@
           <a:p>
             <a:fld id="{F2F96090-85A3-4EE4-B8EC-DF25C09EBF6D}" type="datetimeFigureOut">
               <a:rPr lang="de-AT" smtClean="0"/>
-              <a:t>13.03.2023</a:t>
+              <a:t>20.03.2023</a:t>
             </a:fld>
             <a:endParaRPr lang="de-AT"/>
           </a:p>
@@ -1825,7 +1830,7 @@
           <a:p>
             <a:fld id="{F2F96090-85A3-4EE4-B8EC-DF25C09EBF6D}" type="datetimeFigureOut">
               <a:rPr lang="de-AT" smtClean="0"/>
-              <a:t>13.03.2023</a:t>
+              <a:t>20.03.2023</a:t>
             </a:fld>
             <a:endParaRPr lang="de-AT"/>
           </a:p>
@@ -1967,7 +1972,7 @@
           <a:p>
             <a:fld id="{F2F96090-85A3-4EE4-B8EC-DF25C09EBF6D}" type="datetimeFigureOut">
               <a:rPr lang="de-AT" smtClean="0"/>
-              <a:t>13.03.2023</a:t>
+              <a:t>20.03.2023</a:t>
             </a:fld>
             <a:endParaRPr lang="de-AT"/>
           </a:p>
@@ -2080,7 +2085,7 @@
           <a:p>
             <a:fld id="{F2F96090-85A3-4EE4-B8EC-DF25C09EBF6D}" type="datetimeFigureOut">
               <a:rPr lang="de-AT" smtClean="0"/>
-              <a:t>13.03.2023</a:t>
+              <a:t>20.03.2023</a:t>
             </a:fld>
             <a:endParaRPr lang="de-AT"/>
           </a:p>
@@ -2393,7 +2398,7 @@
           <a:p>
             <a:fld id="{F2F96090-85A3-4EE4-B8EC-DF25C09EBF6D}" type="datetimeFigureOut">
               <a:rPr lang="de-AT" smtClean="0"/>
-              <a:t>13.03.2023</a:t>
+              <a:t>20.03.2023</a:t>
             </a:fld>
             <a:endParaRPr lang="de-AT"/>
           </a:p>
@@ -2682,7 +2687,7 @@
           <a:p>
             <a:fld id="{F2F96090-85A3-4EE4-B8EC-DF25C09EBF6D}" type="datetimeFigureOut">
               <a:rPr lang="de-AT" smtClean="0"/>
-              <a:t>13.03.2023</a:t>
+              <a:t>20.03.2023</a:t>
             </a:fld>
             <a:endParaRPr lang="de-AT"/>
           </a:p>
@@ -2925,7 +2930,7 @@
           <a:p>
             <a:fld id="{F2F96090-85A3-4EE4-B8EC-DF25C09EBF6D}" type="datetimeFigureOut">
               <a:rPr lang="de-AT" smtClean="0"/>
-              <a:t>13.03.2023</a:t>
+              <a:t>20.03.2023</a:t>
             </a:fld>
             <a:endParaRPr lang="de-AT"/>
           </a:p>
@@ -3342,44 +3347,6 @@
           <a:chExt cx="0" cy="0"/>
         </a:xfrm>
       </p:grpSpPr>
-      <p:sp>
-        <p:nvSpPr>
-          <p:cNvPr id="2" name="Titel 1"/>
-          <p:cNvSpPr>
-            <a:spLocks noGrp="1"/>
-          </p:cNvSpPr>
-          <p:nvPr>
-            <p:ph type="ctrTitle"/>
-          </p:nvPr>
-        </p:nvSpPr>
-        <p:spPr/>
-        <p:txBody>
-          <a:bodyPr/>
-          <a:lstStyle/>
-          <a:p>
-            <a:endParaRPr lang="de-DE"/>
-          </a:p>
-        </p:txBody>
-      </p:sp>
-      <p:sp>
-        <p:nvSpPr>
-          <p:cNvPr id="3" name="Untertitel 2"/>
-          <p:cNvSpPr>
-            <a:spLocks noGrp="1"/>
-          </p:cNvSpPr>
-          <p:nvPr>
-            <p:ph type="subTitle" idx="1"/>
-          </p:nvPr>
-        </p:nvSpPr>
-        <p:spPr/>
-        <p:txBody>
-          <a:bodyPr/>
-          <a:lstStyle/>
-          <a:p>
-            <a:endParaRPr lang="de-DE"/>
-          </a:p>
-        </p:txBody>
-      </p:sp>
       <p:pic>
         <p:nvPicPr>
           <p:cNvPr id="7" name="Grafik 6"/>

</xml_diff>